<commit_message>
20181101 updated session 5 slide deck
</commit_message>
<xml_diff>
--- a/Slidedecks/CoderDojoKells_Autumn_Session5_031118.pptx
+++ b/Slidedecks/CoderDojoKells_Autumn_Session5_031118.pptx
@@ -19,6 +19,7 @@
     <p:sldId id="266" r:id="rId14"/>
     <p:sldId id="267" r:id="rId15"/>
     <p:sldId id="268" r:id="rId16"/>
+    <p:sldId id="269" r:id="rId17"/>
   </p:sldIdLst>
   <p:sldSz cx="12192000" cy="6858000"/>
   <p:notesSz cx="7559675" cy="10691812"/>
@@ -2366,7 +2367,7 @@
         <p:spPr>
           <a:xfrm>
             <a:off x="478080" y="360"/>
-            <a:ext cx="226800" cy="6856200"/>
+            <a:ext cx="226440" cy="6855840"/>
           </a:xfrm>
           <a:prstGeom prst="rect">
             <a:avLst/>
@@ -2402,7 +2403,7 @@
         <p:spPr>
           <a:xfrm>
             <a:off x="8151840" y="1685520"/>
-            <a:ext cx="3273120" cy="4406760"/>
+            <a:ext cx="3272760" cy="4406400"/>
           </a:xfrm>
           <a:custGeom>
             <a:avLst/>
@@ -2457,8 +2458,8 @@
         </p:nvSpPr>
         <p:spPr>
           <a:xfrm flipH="1" flipV="1">
-            <a:off x="751320" y="742320"/>
-            <a:ext cx="3273840" cy="4406760"/>
+            <a:off x="750600" y="742320"/>
+            <a:ext cx="3273480" cy="4406400"/>
           </a:xfrm>
           <a:custGeom>
             <a:avLst/>
@@ -2714,7 +2715,7 @@
         <p:spPr>
           <a:xfrm>
             <a:off x="478080" y="360"/>
-            <a:ext cx="226800" cy="6856200"/>
+            <a:ext cx="226440" cy="6855840"/>
           </a:xfrm>
           <a:prstGeom prst="rect">
             <a:avLst/>
@@ -2941,7 +2942,7 @@
         <p:spPr>
           <a:xfrm>
             <a:off x="6552000" y="3240000"/>
-            <a:ext cx="3454560" cy="942120"/>
+            <a:ext cx="3454200" cy="941760"/>
           </a:xfrm>
           <a:prstGeom prst="rect">
             <a:avLst/>
@@ -3010,7 +3011,7 @@
         <p:spPr>
           <a:xfrm>
             <a:off x="2059920" y="1296000"/>
-            <a:ext cx="4201560" cy="4245480"/>
+            <a:ext cx="4201200" cy="4245120"/>
           </a:xfrm>
           <a:prstGeom prst="rect">
             <a:avLst/>
@@ -3078,7 +3079,7 @@
         <p:spPr>
           <a:xfrm>
             <a:off x="1371600" y="685800"/>
-            <a:ext cx="9599400" cy="1484280"/>
+            <a:ext cx="9599040" cy="1483920"/>
           </a:xfrm>
           <a:prstGeom prst="rect">
             <a:avLst/>
@@ -3095,7 +3096,7 @@
           <a:fontRef idx="minor"/>
         </p:style>
         <p:txBody>
-          <a:bodyPr lIns="0" rIns="0" tIns="0" bIns="0" anchor="ctr"/>
+          <a:bodyPr lIns="90000" rIns="90000" tIns="45000" bIns="45000"/>
           <a:p>
             <a:pPr>
               <a:lnSpc>
@@ -3110,7 +3111,7 @@
                 <a:latin typeface="Franklin Gothic Book"/>
                 <a:ea typeface="DejaVu Sans"/>
               </a:rPr>
-              <a:t>This Week Session Challenges</a:t>
+              <a:t>This Week Session Challenges (Scratch)</a:t>
             </a:r>
             <a:endParaRPr/>
           </a:p>
@@ -3124,8 +3125,8 @@
         </p:nvSpPr>
         <p:spPr>
           <a:xfrm>
-            <a:off x="921240" y="2016000"/>
-            <a:ext cx="10957320" cy="3892320"/>
+            <a:off x="1371600" y="1440000"/>
+            <a:ext cx="9599040" cy="5254200"/>
           </a:xfrm>
           <a:prstGeom prst="rect">
             <a:avLst/>
@@ -3149,6 +3150,17 @@
                 <a:spcPct val="100000"/>
               </a:lnSpc>
             </a:pPr>
+            <a:endParaRPr/>
+          </a:p>
+          <a:p>
+            <a:pPr>
+              <a:lnSpc>
+                <a:spcPct val="100000"/>
+              </a:lnSpc>
+              <a:buSzPct val="45000"/>
+              <a:buFont typeface="StarSymbol"/>
+              <a:buChar char=""/>
+            </a:pPr>
             <a:r>
               <a:rPr lang="en-GB" sz="3600" strike="noStrike">
                 <a:solidFill>
@@ -3157,7 +3169,7 @@
                 <a:latin typeface="Franklin Gothic Book"/>
                 <a:ea typeface="DejaVu Sans"/>
               </a:rPr>
-              <a:t>HTML / CSS:</a:t>
+              <a:t>Copy the code on screen to your own Scratch project.</a:t>
             </a:r>
             <a:endParaRPr/>
           </a:p>
@@ -3166,6 +3178,9 @@
               <a:lnSpc>
                 <a:spcPct val="100000"/>
               </a:lnSpc>
+              <a:buSzPct val="45000"/>
+              <a:buFont typeface="StarSymbol"/>
+              <a:buChar char=""/>
             </a:pPr>
             <a:r>
               <a:rPr lang="en-GB" sz="3600" strike="noStrike">
@@ -3175,7 +3190,7 @@
                 <a:latin typeface="Franklin Gothic Book"/>
                 <a:ea typeface="DejaVu Sans"/>
               </a:rPr>
-              <a:t>1. Can you embed a Scratch project in a web page?</a:t>
+              <a:t>Run it – is it working? If not, can you find what is wrong? </a:t>
             </a:r>
             <a:endParaRPr/>
           </a:p>
@@ -3184,6 +3199,9 @@
               <a:lnSpc>
                 <a:spcPct val="100000"/>
               </a:lnSpc>
+              <a:buSzPct val="45000"/>
+              <a:buFont typeface="StarSymbol"/>
+              <a:buChar char=""/>
             </a:pPr>
             <a:r>
               <a:rPr lang="en-GB" sz="3600" strike="noStrike">
@@ -3193,7 +3211,7 @@
                 <a:latin typeface="Franklin Gothic Book"/>
                 <a:ea typeface="DejaVu Sans"/>
               </a:rPr>
-              <a:t>2. Create a web page to showcase your Scratch projects. How might you lay it out? </a:t>
+              <a:t>Can you make this better?</a:t>
             </a:r>
             <a:endParaRPr/>
           </a:p>
@@ -3257,7 +3275,7 @@
         <p:spPr>
           <a:xfrm>
             <a:off x="1371600" y="685800"/>
-            <a:ext cx="9599400" cy="1484280"/>
+            <a:ext cx="9599040" cy="1483920"/>
           </a:xfrm>
           <a:prstGeom prst="rect">
             <a:avLst/>
@@ -3274,7 +3292,7 @@
           <a:fontRef idx="minor"/>
         </p:style>
         <p:txBody>
-          <a:bodyPr lIns="90000" rIns="90000" tIns="45000" bIns="45000"/>
+          <a:bodyPr lIns="0" rIns="0" tIns="0" bIns="0" anchor="ctr"/>
           <a:p>
             <a:pPr>
               <a:lnSpc>
@@ -3289,7 +3307,7 @@
                 <a:latin typeface="Franklin Gothic Book"/>
                 <a:ea typeface="DejaVu Sans"/>
               </a:rPr>
-              <a:t>Brainstorm</a:t>
+              <a:t>This Week Session Challenges (HTML)</a:t>
             </a:r>
             <a:endParaRPr/>
           </a:p>
@@ -3303,8 +3321,8 @@
         </p:nvSpPr>
         <p:spPr>
           <a:xfrm>
-            <a:off x="4150800" y="905400"/>
-            <a:ext cx="822960" cy="241200"/>
+            <a:off x="921240" y="2016000"/>
+            <a:ext cx="10956960" cy="3891960"/>
           </a:xfrm>
           <a:prstGeom prst="rect">
             <a:avLst/>
@@ -3329,14 +3347,50 @@
               </a:lnSpc>
             </a:pPr>
             <a:r>
-              <a:rPr lang="en-GB" sz="1000" strike="noStrike">
+              <a:rPr lang="en-GB" sz="3600" strike="noStrike">
                 <a:solidFill>
-                  <a:srgbClr val="000000"/>
+                  <a:srgbClr val="191b0e"/>
                 </a:solidFill>
                 <a:latin typeface="Franklin Gothic Book"/>
                 <a:ea typeface="DejaVu Sans"/>
               </a:rPr>
-              <a:t>5-10 mins</a:t>
+              <a:t>HTML / CSS:</a:t>
+            </a:r>
+            <a:endParaRPr/>
+          </a:p>
+          <a:p>
+            <a:pPr>
+              <a:lnSpc>
+                <a:spcPct val="100000"/>
+              </a:lnSpc>
+            </a:pPr>
+            <a:r>
+              <a:rPr lang="en-GB" sz="3600" strike="noStrike">
+                <a:solidFill>
+                  <a:srgbClr val="191b0e"/>
+                </a:solidFill>
+                <a:latin typeface="Franklin Gothic Book"/>
+                <a:ea typeface="DejaVu Sans"/>
+              </a:rPr>
+              <a:t>1. Can you embed a Scratch project in a web page?</a:t>
+            </a:r>
+            <a:endParaRPr/>
+          </a:p>
+          <a:p>
+            <a:pPr>
+              <a:lnSpc>
+                <a:spcPct val="100000"/>
+              </a:lnSpc>
+            </a:pPr>
+            <a:r>
+              <a:rPr lang="en-GB" sz="3600" strike="noStrike">
+                <a:solidFill>
+                  <a:srgbClr val="191b0e"/>
+                </a:solidFill>
+                <a:latin typeface="Franklin Gothic Book"/>
+                <a:ea typeface="DejaVu Sans"/>
+              </a:rPr>
+              <a:t>2. Create a web page to showcase any Scratch projects you might have saved. How might you lay it out? </a:t>
             </a:r>
             <a:endParaRPr/>
           </a:p>
@@ -3400,7 +3454,7 @@
         <p:spPr>
           <a:xfrm>
             <a:off x="1371600" y="685800"/>
-            <a:ext cx="9599400" cy="1484280"/>
+            <a:ext cx="9599040" cy="1483920"/>
           </a:xfrm>
           <a:prstGeom prst="rect">
             <a:avLst/>
@@ -3432,7 +3486,7 @@
                 <a:latin typeface="Franklin Gothic Book"/>
                 <a:ea typeface="DejaVu Sans"/>
               </a:rPr>
-              <a:t>Get Coding</a:t>
+              <a:t>Brainstorm</a:t>
             </a:r>
             <a:endParaRPr/>
           </a:p>
@@ -3447,7 +3501,7 @@
         <p:spPr>
           <a:xfrm>
             <a:off x="4150800" y="905400"/>
-            <a:ext cx="822960" cy="392760"/>
+            <a:ext cx="822600" cy="240840"/>
           </a:xfrm>
           <a:prstGeom prst="rect">
             <a:avLst/>
@@ -3479,7 +3533,7 @@
                 <a:latin typeface="Franklin Gothic Book"/>
                 <a:ea typeface="DejaVu Sans"/>
               </a:rPr>
-              <a:t>45-60 mins</a:t>
+              <a:t>5-10 mins</a:t>
             </a:r>
             <a:endParaRPr/>
           </a:p>
@@ -3543,7 +3597,7 @@
         <p:spPr>
           <a:xfrm>
             <a:off x="1371600" y="685800"/>
-            <a:ext cx="9599400" cy="1484280"/>
+            <a:ext cx="9599040" cy="1483920"/>
           </a:xfrm>
           <a:prstGeom prst="rect">
             <a:avLst/>
@@ -3575,12 +3629,82 @@
                 <a:latin typeface="Franklin Gothic Book"/>
                 <a:ea typeface="DejaVu Sans"/>
               </a:rPr>
-              <a:t>Showtime</a:t>
-            </a:r>
-            <a:endParaRPr/>
-          </a:p>
-        </p:txBody>
-      </p:sp>
+              <a:t>Get Coding</a:t>
+            </a:r>
+            <a:endParaRPr/>
+          </a:p>
+        </p:txBody>
+      </p:sp>
+      <p:sp>
+        <p:nvSpPr>
+          <p:cNvPr id="101" name="CustomShape 2"/>
+          <p:cNvSpPr/>
+          <p:nvPr/>
+        </p:nvSpPr>
+        <p:spPr>
+          <a:xfrm>
+            <a:off x="4150800" y="905400"/>
+            <a:ext cx="822600" cy="392400"/>
+          </a:xfrm>
+          <a:prstGeom prst="rect">
+            <a:avLst/>
+          </a:prstGeom>
+          <a:noFill/>
+          <a:ln>
+            <a:noFill/>
+          </a:ln>
+        </p:spPr>
+        <p:style>
+          <a:lnRef idx="0"/>
+          <a:fillRef idx="0"/>
+          <a:effectRef idx="0"/>
+          <a:fontRef idx="minor"/>
+        </p:style>
+        <p:txBody>
+          <a:bodyPr lIns="90000" rIns="90000" tIns="45000" bIns="45000"/>
+          <a:p>
+            <a:pPr>
+              <a:lnSpc>
+                <a:spcPct val="100000"/>
+              </a:lnSpc>
+            </a:pPr>
+            <a:r>
+              <a:rPr lang="en-GB" sz="1000" strike="noStrike">
+                <a:solidFill>
+                  <a:srgbClr val="000000"/>
+                </a:solidFill>
+                <a:latin typeface="Franklin Gothic Book"/>
+                <a:ea typeface="DejaVu Sans"/>
+              </a:rPr>
+              <a:t>45-60 mins</a:t>
+            </a:r>
+            <a:endParaRPr/>
+          </a:p>
+        </p:txBody>
+      </p:sp>
+      <p:pic>
+        <p:nvPicPr>
+          <p:cNvPr id="102" name="" descr=""/>
+          <p:cNvPicPr/>
+          <p:nvPr/>
+        </p:nvPicPr>
+        <p:blipFill>
+          <a:blip r:embed="rId1"/>
+          <a:stretch/>
+        </p:blipFill>
+        <p:spPr>
+          <a:xfrm>
+            <a:off x="1944000" y="1656000"/>
+            <a:ext cx="5760000" cy="4392000"/>
+          </a:xfrm>
+          <a:prstGeom prst="rect">
+            <a:avLst/>
+          </a:prstGeom>
+          <a:ln>
+            <a:noFill/>
+          </a:ln>
+        </p:spPr>
+      </p:pic>
     </p:spTree>
   </p:cSld>
   <p:timing>
@@ -3590,6 +3714,102 @@
           <p:childTnLst>
             <p:seq>
               <p:cTn id="26" nodeType="mainSeq"/>
+              <p:prevCondLst>
+                <p:cond delay="0" evt="onPrev">
+                  <p:tgtEl>
+                    <p:sldTgt/>
+                  </p:tgtEl>
+                </p:cond>
+              </p:prevCondLst>
+              <p:nextCondLst>
+                <p:cond delay="0" evt="onNext">
+                  <p:tgtEl>
+                    <p:sldTgt/>
+                  </p:tgtEl>
+                </p:cond>
+              </p:nextCondLst>
+            </p:seq>
+          </p:childTnLst>
+        </p:cTn>
+      </p:par>
+    </p:tnLst>
+  </p:timing>
+</p:sld>
+</file>
+
+<file path=ppt/slides/slide14.xml><?xml version="1.0" encoding="utf-8"?>
+<p:sld xmlns:a="http://schemas.openxmlformats.org/drawingml/2006/main" xmlns:p="http://schemas.openxmlformats.org/presentationml/2006/main" xmlns:r="http://schemas.openxmlformats.org/officeDocument/2006/relationships">
+  <p:cSld>
+    <p:spTree>
+      <p:nvGrpSpPr>
+        <p:cNvPr id="1" name=""/>
+        <p:cNvGrpSpPr/>
+        <p:nvPr/>
+      </p:nvGrpSpPr>
+      <p:grpSpPr>
+        <a:xfrm>
+          <a:off x="0" y="0"/>
+          <a:ext cx="0" cy="0"/>
+          <a:chOff x="0" y="0"/>
+          <a:chExt cx="0" cy="0"/>
+        </a:xfrm>
+      </p:grpSpPr>
+      <p:sp>
+        <p:nvSpPr>
+          <p:cNvPr id="103" name="CustomShape 1"/>
+          <p:cNvSpPr/>
+          <p:nvPr/>
+        </p:nvSpPr>
+        <p:spPr>
+          <a:xfrm>
+            <a:off x="1371600" y="685800"/>
+            <a:ext cx="9599040" cy="1483920"/>
+          </a:xfrm>
+          <a:prstGeom prst="rect">
+            <a:avLst/>
+          </a:prstGeom>
+          <a:noFill/>
+          <a:ln>
+            <a:noFill/>
+          </a:ln>
+        </p:spPr>
+        <p:style>
+          <a:lnRef idx="0"/>
+          <a:fillRef idx="0"/>
+          <a:effectRef idx="0"/>
+          <a:fontRef idx="minor"/>
+        </p:style>
+        <p:txBody>
+          <a:bodyPr lIns="90000" rIns="90000" tIns="45000" bIns="45000"/>
+          <a:p>
+            <a:pPr>
+              <a:lnSpc>
+                <a:spcPct val="89000"/>
+              </a:lnSpc>
+            </a:pPr>
+            <a:r>
+              <a:rPr lang="en-GB" sz="4400" strike="noStrike">
+                <a:solidFill>
+                  <a:srgbClr val="191b0e"/>
+                </a:solidFill>
+                <a:latin typeface="Franklin Gothic Book"/>
+                <a:ea typeface="DejaVu Sans"/>
+              </a:rPr>
+              <a:t>Showtime</a:t>
+            </a:r>
+            <a:endParaRPr/>
+          </a:p>
+        </p:txBody>
+      </p:sp>
+    </p:spTree>
+  </p:cSld>
+  <p:timing>
+    <p:tnLst>
+      <p:par>
+        <p:cTn id="27" dur="indefinite" restart="never" nodeType="tmRoot">
+          <p:childTnLst>
+            <p:seq>
+              <p:cTn id="28" nodeType="mainSeq"/>
               <p:prevCondLst>
                 <p:cond delay="0" evt="onPrev">
                   <p:tgtEl>
@@ -3639,7 +3859,7 @@
         <p:spPr>
           <a:xfrm>
             <a:off x="1371600" y="685800"/>
-            <a:ext cx="9599400" cy="1484280"/>
+            <a:ext cx="9599040" cy="1483920"/>
           </a:xfrm>
           <a:prstGeom prst="rect">
             <a:avLst/>
@@ -3686,7 +3906,7 @@
         <p:spPr>
           <a:xfrm>
             <a:off x="1371600" y="2286000"/>
-            <a:ext cx="9599400" cy="3579480"/>
+            <a:ext cx="9599040" cy="3579120"/>
           </a:xfrm>
           <a:prstGeom prst="rect">
             <a:avLst/>
@@ -3904,7 +4124,7 @@
         <p:spPr>
           <a:xfrm>
             <a:off x="1371600" y="685800"/>
-            <a:ext cx="9599400" cy="1484280"/>
+            <a:ext cx="9599040" cy="1483920"/>
           </a:xfrm>
           <a:prstGeom prst="rect">
             <a:avLst/>
@@ -3951,7 +4171,7 @@
         <p:spPr>
           <a:xfrm>
             <a:off x="1371600" y="2286000"/>
-            <a:ext cx="9599400" cy="3579480"/>
+            <a:ext cx="9599040" cy="3579120"/>
           </a:xfrm>
           <a:prstGeom prst="rect">
             <a:avLst/>
@@ -4189,7 +4409,7 @@
         <p:spPr>
           <a:xfrm>
             <a:off x="1371600" y="685800"/>
-            <a:ext cx="9599400" cy="1484280"/>
+            <a:ext cx="9599040" cy="1483920"/>
           </a:xfrm>
           <a:prstGeom prst="rect">
             <a:avLst/>
@@ -4236,7 +4456,7 @@
         <p:spPr>
           <a:xfrm>
             <a:off x="1371600" y="2286000"/>
-            <a:ext cx="9599400" cy="4229640"/>
+            <a:ext cx="9599040" cy="4229280"/>
           </a:xfrm>
           <a:prstGeom prst="rect">
             <a:avLst/>
@@ -4442,7 +4662,7 @@
         <p:spPr>
           <a:xfrm>
             <a:off x="1371600" y="685800"/>
-            <a:ext cx="9599400" cy="1484280"/>
+            <a:ext cx="9599040" cy="1483920"/>
           </a:xfrm>
           <a:prstGeom prst="rect">
             <a:avLst/>
@@ -4489,7 +4709,7 @@
         <p:spPr>
           <a:xfrm>
             <a:off x="1306080" y="1584000"/>
-            <a:ext cx="7116480" cy="4964040"/>
+            <a:ext cx="7116120" cy="4963680"/>
           </a:xfrm>
           <a:prstGeom prst="rect">
             <a:avLst/>
@@ -4647,7 +4867,7 @@
         <p:spPr>
           <a:xfrm>
             <a:off x="1371600" y="685800"/>
-            <a:ext cx="9599400" cy="1484280"/>
+            <a:ext cx="9599040" cy="1483920"/>
           </a:xfrm>
           <a:prstGeom prst="rect">
             <a:avLst/>
@@ -4694,7 +4914,7 @@
         <p:spPr>
           <a:xfrm>
             <a:off x="1493280" y="1574280"/>
-            <a:ext cx="6989400" cy="637560"/>
+            <a:ext cx="6989040" cy="637200"/>
           </a:xfrm>
           <a:prstGeom prst="rect">
             <a:avLst/>
@@ -4792,7 +5012,7 @@
         <p:spPr>
           <a:xfrm>
             <a:off x="1371600" y="685800"/>
-            <a:ext cx="9599400" cy="1484280"/>
+            <a:ext cx="9599040" cy="1483920"/>
           </a:xfrm>
           <a:prstGeom prst="rect">
             <a:avLst/>
@@ -4839,7 +5059,7 @@
         <p:spPr>
           <a:xfrm>
             <a:off x="3738240" y="923400"/>
-            <a:ext cx="822960" cy="241200"/>
+            <a:ext cx="822600" cy="240840"/>
           </a:xfrm>
           <a:prstGeom prst="rect">
             <a:avLst/>
@@ -4935,7 +5155,7 @@
         <p:spPr>
           <a:xfrm>
             <a:off x="1371600" y="685800"/>
-            <a:ext cx="9599400" cy="1484280"/>
+            <a:ext cx="9599040" cy="1483920"/>
           </a:xfrm>
           <a:prstGeom prst="rect">
             <a:avLst/>
@@ -4982,7 +5202,7 @@
         <p:spPr>
           <a:xfrm>
             <a:off x="5190480" y="923400"/>
-            <a:ext cx="822960" cy="241200"/>
+            <a:ext cx="822600" cy="240840"/>
           </a:xfrm>
           <a:prstGeom prst="rect">
             <a:avLst/>
@@ -5071,14 +5291,14 @@
       </p:grpSpPr>
       <p:sp>
         <p:nvSpPr>
-          <p:cNvPr id="92" name="CustomShape 1"/>
-          <p:cNvSpPr/>
+          <p:cNvPr id="92" name="TextShape 1"/>
+          <p:cNvSpPr txBox="1"/>
           <p:nvPr/>
         </p:nvSpPr>
         <p:spPr>
           <a:xfrm>
-            <a:off x="1371600" y="685800"/>
-            <a:ext cx="9599400" cy="1484280"/>
+            <a:off x="1541520" y="931320"/>
+            <a:ext cx="9690480" cy="940680"/>
           </a:xfrm>
           <a:prstGeom prst="rect">
             <a:avLst/>
@@ -5088,12 +5308,6 @@
             <a:noFill/>
           </a:ln>
         </p:spPr>
-        <p:style>
-          <a:lnRef idx="0"/>
-          <a:fillRef idx="0"/>
-          <a:effectRef idx="0"/>
-          <a:fontRef idx="minor"/>
-        </p:style>
         <p:txBody>
           <a:bodyPr lIns="90000" rIns="90000" tIns="45000" bIns="45000"/>
           <a:p>
@@ -5110,22 +5324,22 @@
                 <a:latin typeface="Franklin Gothic Book"/>
                 <a:ea typeface="DejaVu Sans"/>
               </a:rPr>
-              <a:t>This Week Session Challenges</a:t>
-            </a:r>
-            <a:endParaRPr/>
-          </a:p>
-        </p:txBody>
-      </p:sp>
-      <p:sp>
-        <p:nvSpPr>
-          <p:cNvPr id="93" name="CustomShape 2"/>
-          <p:cNvSpPr/>
+              <a:t>This Week Session Challenges (Scratch)</a:t>
+            </a:r>
+            <a:endParaRPr/>
+          </a:p>
+        </p:txBody>
+      </p:sp>
+      <p:sp>
+        <p:nvSpPr>
+          <p:cNvPr id="93" name="TextShape 2"/>
+          <p:cNvSpPr txBox="1"/>
           <p:nvPr/>
         </p:nvSpPr>
         <p:spPr>
           <a:xfrm>
-            <a:off x="1371600" y="1440000"/>
-            <a:ext cx="9599400" cy="5254560"/>
+            <a:off x="1296000" y="1983240"/>
+            <a:ext cx="10364040" cy="4280760"/>
           </a:xfrm>
           <a:prstGeom prst="rect">
             <a:avLst/>
@@ -5135,12 +5349,6 @@
             <a:noFill/>
           </a:ln>
         </p:spPr>
-        <p:style>
-          <a:lnRef idx="0"/>
-          <a:fillRef idx="0"/>
-          <a:effectRef idx="0"/>
-          <a:fontRef idx="minor"/>
-        </p:style>
         <p:txBody>
           <a:bodyPr lIns="90000" rIns="90000" tIns="45000" bIns="45000"/>
           <a:p>
@@ -5148,35 +5356,6 @@
               <a:lnSpc>
                 <a:spcPct val="100000"/>
               </a:lnSpc>
-            </a:pPr>
-            <a:r>
-              <a:rPr b="1" lang="en-GB" sz="3600" strike="noStrike">
-                <a:solidFill>
-                  <a:srgbClr val="191b0e"/>
-                </a:solidFill>
-                <a:latin typeface="Franklin Gothic Book"/>
-                <a:ea typeface="DejaVu Sans"/>
-              </a:rPr>
-              <a:t>Scratchers:</a:t>
-            </a:r>
-            <a:endParaRPr/>
-          </a:p>
-          <a:p>
-            <a:pPr>
-              <a:lnSpc>
-                <a:spcPct val="100000"/>
-              </a:lnSpc>
-            </a:pPr>
-            <a:endParaRPr/>
-          </a:p>
-          <a:p>
-            <a:pPr>
-              <a:lnSpc>
-                <a:spcPct val="100000"/>
-              </a:lnSpc>
-              <a:buSzPct val="45000"/>
-              <a:buFont typeface="StarSymbol"/>
-              <a:buChar char=""/>
             </a:pPr>
             <a:r>
               <a:rPr lang="en-GB" sz="3600" strike="noStrike">
@@ -5186,7 +5365,7 @@
                 <a:latin typeface="Franklin Gothic Book"/>
                 <a:ea typeface="DejaVu Sans"/>
               </a:rPr>
-              <a:t>Copy the code on screen to your own Scratch project.</a:t>
+              <a:t>Background: </a:t>
             </a:r>
             <a:endParaRPr/>
           </a:p>
@@ -5195,61 +5374,24 @@
               <a:lnSpc>
                 <a:spcPct val="100000"/>
               </a:lnSpc>
-              <a:buSzPct val="45000"/>
-              <a:buFont typeface="StarSymbol"/>
-              <a:buChar char=""/>
-            </a:pPr>
-            <a:r>
-              <a:rPr b="1" lang="en-GB" sz="3600" strike="noStrike">
+            </a:pPr>
+            <a:endParaRPr/>
+          </a:p>
+          <a:p>
+            <a:pPr>
+              <a:lnSpc>
+                <a:spcPct val="100000"/>
+              </a:lnSpc>
+            </a:pPr>
+            <a:r>
+              <a:rPr lang="en-GB" sz="3600" strike="noStrike">
                 <a:solidFill>
                   <a:srgbClr val="191b0e"/>
                 </a:solidFill>
                 <a:latin typeface="Franklin Gothic Book"/>
                 <a:ea typeface="DejaVu Sans"/>
               </a:rPr>
-              <a:t>Run it – is it working? If not, can you find what is wrong? </a:t>
-            </a:r>
-            <a:endParaRPr/>
-          </a:p>
-          <a:p>
-            <a:pPr>
-              <a:lnSpc>
-                <a:spcPct val="100000"/>
-              </a:lnSpc>
-              <a:buSzPct val="45000"/>
-              <a:buFont typeface="StarSymbol"/>
-              <a:buChar char=""/>
-            </a:pPr>
-            <a:r>
-              <a:rPr b="1" lang="en-GB" sz="3600" strike="noStrike">
-                <a:solidFill>
-                  <a:srgbClr val="191b0e"/>
-                </a:solidFill>
-                <a:latin typeface="Franklin Gothic Book"/>
-                <a:ea typeface="DejaVu Sans"/>
-              </a:rPr>
-              <a:t>Can you make this better?</a:t>
-            </a:r>
-            <a:endParaRPr/>
-          </a:p>
-          <a:p>
-            <a:pPr>
-              <a:lnSpc>
-                <a:spcPct val="100000"/>
-              </a:lnSpc>
-              <a:buSzPct val="45000"/>
-              <a:buFont typeface="StarSymbol"/>
-              <a:buChar char=""/>
-            </a:pPr>
-            <a:r>
-              <a:rPr b="1" lang="en-GB" sz="3600" strike="noStrike">
-                <a:solidFill>
-                  <a:srgbClr val="191b0e"/>
-                </a:solidFill>
-                <a:latin typeface="Franklin Gothic Book"/>
-                <a:ea typeface="DejaVu Sans"/>
-              </a:rPr>
-              <a:t>Tip: Feel free to be creative with your chosen sprite character</a:t>
+              <a:t>Moving a character towards a desired object. Example shows a cat trying to get a trophy, but you can be creative and select your own character and desired object.</a:t>
             </a:r>
             <a:endParaRPr/>
           </a:p>

</xml_diff>